<commit_message>
Button spacing. Background shadow. Color
</commit_message>
<xml_diff>
--- a/dev/graphics.pptx
+++ b/dev/graphics.pptx
@@ -104,6 +104,11 @@
       </a:defRPr>
     </a:lvl9pPr>
   </p:defaultTextStyle>
+  <p:extLst>
+    <p:ext uri="{EFAFB233-063F-42B5-8137-9DF3F51BA10A}">
+      <p15:sldGuideLst xmlns:p15="http://schemas.microsoft.com/office/powerpoint/2012/main"/>
+    </p:ext>
+  </p:extLst>
 </p:presentation>
 </file>
 
@@ -254,7 +259,7 @@
           <a:p>
             <a:fld id="{D66C5226-EF00-42D6-B14B-CC50C5A09372}" type="datetimeFigureOut">
               <a:rPr lang="en-US" smtClean="0"/>
-              <a:t>7/10/2018</a:t>
+              <a:t>7/11/2018</a:t>
             </a:fld>
             <a:endParaRPr lang="en-US"/>
           </a:p>
@@ -452,7 +457,7 @@
           <a:p>
             <a:fld id="{D66C5226-EF00-42D6-B14B-CC50C5A09372}" type="datetimeFigureOut">
               <a:rPr lang="en-US" smtClean="0"/>
-              <a:t>7/10/2018</a:t>
+              <a:t>7/11/2018</a:t>
             </a:fld>
             <a:endParaRPr lang="en-US"/>
           </a:p>
@@ -660,7 +665,7 @@
           <a:p>
             <a:fld id="{D66C5226-EF00-42D6-B14B-CC50C5A09372}" type="datetimeFigureOut">
               <a:rPr lang="en-US" smtClean="0"/>
-              <a:t>7/10/2018</a:t>
+              <a:t>7/11/2018</a:t>
             </a:fld>
             <a:endParaRPr lang="en-US"/>
           </a:p>
@@ -858,7 +863,7 @@
           <a:p>
             <a:fld id="{D66C5226-EF00-42D6-B14B-CC50C5A09372}" type="datetimeFigureOut">
               <a:rPr lang="en-US" smtClean="0"/>
-              <a:t>7/10/2018</a:t>
+              <a:t>7/11/2018</a:t>
             </a:fld>
             <a:endParaRPr lang="en-US"/>
           </a:p>
@@ -1133,7 +1138,7 @@
           <a:p>
             <a:fld id="{D66C5226-EF00-42D6-B14B-CC50C5A09372}" type="datetimeFigureOut">
               <a:rPr lang="en-US" smtClean="0"/>
-              <a:t>7/10/2018</a:t>
+              <a:t>7/11/2018</a:t>
             </a:fld>
             <a:endParaRPr lang="en-US"/>
           </a:p>
@@ -1398,7 +1403,7 @@
           <a:p>
             <a:fld id="{D66C5226-EF00-42D6-B14B-CC50C5A09372}" type="datetimeFigureOut">
               <a:rPr lang="en-US" smtClean="0"/>
-              <a:t>7/10/2018</a:t>
+              <a:t>7/11/2018</a:t>
             </a:fld>
             <a:endParaRPr lang="en-US"/>
           </a:p>
@@ -1810,7 +1815,7 @@
           <a:p>
             <a:fld id="{D66C5226-EF00-42D6-B14B-CC50C5A09372}" type="datetimeFigureOut">
               <a:rPr lang="en-US" smtClean="0"/>
-              <a:t>7/10/2018</a:t>
+              <a:t>7/11/2018</a:t>
             </a:fld>
             <a:endParaRPr lang="en-US"/>
           </a:p>
@@ -1951,7 +1956,7 @@
           <a:p>
             <a:fld id="{D66C5226-EF00-42D6-B14B-CC50C5A09372}" type="datetimeFigureOut">
               <a:rPr lang="en-US" smtClean="0"/>
-              <a:t>7/10/2018</a:t>
+              <a:t>7/11/2018</a:t>
             </a:fld>
             <a:endParaRPr lang="en-US"/>
           </a:p>
@@ -2064,7 +2069,7 @@
           <a:p>
             <a:fld id="{D66C5226-EF00-42D6-B14B-CC50C5A09372}" type="datetimeFigureOut">
               <a:rPr lang="en-US" smtClean="0"/>
-              <a:t>7/10/2018</a:t>
+              <a:t>7/11/2018</a:t>
             </a:fld>
             <a:endParaRPr lang="en-US"/>
           </a:p>
@@ -2375,7 +2380,7 @@
           <a:p>
             <a:fld id="{D66C5226-EF00-42D6-B14B-CC50C5A09372}" type="datetimeFigureOut">
               <a:rPr lang="en-US" smtClean="0"/>
-              <a:t>7/10/2018</a:t>
+              <a:t>7/11/2018</a:t>
             </a:fld>
             <a:endParaRPr lang="en-US"/>
           </a:p>
@@ -2663,7 +2668,7 @@
           <a:p>
             <a:fld id="{D66C5226-EF00-42D6-B14B-CC50C5A09372}" type="datetimeFigureOut">
               <a:rPr lang="en-US" smtClean="0"/>
-              <a:t>7/10/2018</a:t>
+              <a:t>7/11/2018</a:t>
             </a:fld>
             <a:endParaRPr lang="en-US"/>
           </a:p>
@@ -2904,7 +2909,7 @@
           <a:p>
             <a:fld id="{D66C5226-EF00-42D6-B14B-CC50C5A09372}" type="datetimeFigureOut">
               <a:rPr lang="en-US" smtClean="0"/>
-              <a:t>7/10/2018</a:t>
+              <a:t>7/11/2018</a:t>
             </a:fld>
             <a:endParaRPr lang="en-US"/>
           </a:p>
@@ -3323,10 +3328,10 @@
       </p:grpSpPr>
       <p:grpSp>
         <p:nvGrpSpPr>
-          <p:cNvPr id="28" name="Group 27">
-            <a:extLst>
-              <a:ext uri="{FF2B5EF4-FFF2-40B4-BE49-F238E27FC236}">
-                <a16:creationId xmlns:a16="http://schemas.microsoft.com/office/drawing/2014/main" id="{40167CEF-A017-43E1-8152-751E33B54F6D}"/>
+          <p:cNvPr id="10" name="Group 9">
+            <a:extLst>
+              <a:ext uri="{FF2B5EF4-FFF2-40B4-BE49-F238E27FC236}">
+                <a16:creationId xmlns:a16="http://schemas.microsoft.com/office/drawing/2014/main" id="{347C8CF0-E4F0-4D19-A8EC-9F9A1987E725}"/>
               </a:ext>
             </a:extLst>
           </p:cNvPr>
@@ -3335,10 +3340,10 @@
         </p:nvGrpSpPr>
         <p:grpSpPr>
           <a:xfrm>
-            <a:off x="534299" y="427547"/>
-            <a:ext cx="3522452" cy="1015663"/>
-            <a:chOff x="3001274" y="2437322"/>
-            <a:chExt cx="3522452" cy="1015663"/>
+            <a:off x="2061949" y="1522637"/>
+            <a:ext cx="9080590" cy="2577772"/>
+            <a:chOff x="2061949" y="1522637"/>
+            <a:chExt cx="9080590" cy="2577772"/>
           </a:xfrm>
         </p:grpSpPr>
         <p:sp>
@@ -3355,8 +3360,8 @@
           </p:nvSpPr>
           <p:spPr>
             <a:xfrm>
-              <a:off x="3001274" y="2437322"/>
-              <a:ext cx="3522452" cy="830997"/>
+              <a:off x="2061949" y="1522637"/>
+              <a:ext cx="9080590" cy="2062103"/>
             </a:xfrm>
             <a:prstGeom prst="rect">
               <a:avLst/>
@@ -3374,7 +3379,7 @@
             <a:p>
               <a:pPr algn="ctr"/>
               <a:r>
-                <a:rPr lang="en-US" sz="4800" b="1" dirty="0">
+                <a:rPr lang="en-US" sz="12800" b="1" dirty="0">
                   <a:latin typeface="Bebas" pitchFamily="2" charset="0"/>
                 </a:rPr>
                 <a:t>Cheeky Beak</a:t>
@@ -3382,153 +3387,132 @@
             </a:p>
           </p:txBody>
         </p:sp>
-        <p:grpSp>
-          <p:nvGrpSpPr>
-            <p:cNvPr id="27" name="Group 26">
+        <p:sp>
+          <p:nvSpPr>
+            <p:cNvPr id="6" name="TextBox 5">
               <a:extLst>
                 <a:ext uri="{FF2B5EF4-FFF2-40B4-BE49-F238E27FC236}">
-                  <a16:creationId xmlns:a16="http://schemas.microsoft.com/office/drawing/2014/main" id="{BA05B421-DA8B-441C-8F4B-701ACB3E4317}"/>
+                  <a16:creationId xmlns:a16="http://schemas.microsoft.com/office/drawing/2014/main" id="{14F7B207-3A9C-4A29-8EA0-FCF15DA0C363}"/>
                 </a:ext>
               </a:extLst>
             </p:cNvPr>
-            <p:cNvGrpSpPr/>
+            <p:cNvSpPr txBox="1"/>
             <p:nvPr/>
-          </p:nvGrpSpPr>
-          <p:grpSpPr>
+          </p:nvSpPr>
+          <p:spPr>
             <a:xfrm>
-              <a:off x="3001274" y="3083653"/>
-              <a:ext cx="3522452" cy="369332"/>
-              <a:chOff x="3001274" y="3152002"/>
-              <a:chExt cx="3522452" cy="369332"/>
+              <a:off x="5435464" y="3269412"/>
+              <a:ext cx="2333559" cy="830997"/>
             </a:xfrm>
-          </p:grpSpPr>
-          <p:sp>
-            <p:nvSpPr>
-              <p:cNvPr id="6" name="TextBox 5">
-                <a:extLst>
-                  <a:ext uri="{FF2B5EF4-FFF2-40B4-BE49-F238E27FC236}">
-                    <a16:creationId xmlns:a16="http://schemas.microsoft.com/office/drawing/2014/main" id="{14F7B207-3A9C-4A29-8EA0-FCF15DA0C363}"/>
-                  </a:ext>
-                </a:extLst>
-              </p:cNvPr>
-              <p:cNvSpPr txBox="1"/>
-              <p:nvPr/>
-            </p:nvSpPr>
-            <p:spPr>
-              <a:xfrm>
-                <a:off x="4266302" y="3152002"/>
-                <a:ext cx="992396" cy="369332"/>
-              </a:xfrm>
-              <a:prstGeom prst="rect">
-                <a:avLst/>
-              </a:prstGeom>
-              <a:noFill/>
-            </p:spPr>
-            <p:txBody>
-              <a:bodyPr wrap="square" rtlCol="0">
-                <a:spAutoFit/>
-              </a:bodyPr>
-              <a:lstStyle/>
-              <a:p>
-                <a:pPr algn="ctr"/>
-                <a:r>
-                  <a:rPr lang="en-US" dirty="0">
-                    <a:latin typeface="Bebas" pitchFamily="2" charset="0"/>
-                  </a:rPr>
-                  <a:t>Card   Co</a:t>
-                </a:r>
-              </a:p>
-            </p:txBody>
-          </p:sp>
-          <p:cxnSp>
-            <p:nvCxnSpPr>
-              <p:cNvPr id="8" name="Straight Connector 7">
-                <a:extLst>
-                  <a:ext uri="{FF2B5EF4-FFF2-40B4-BE49-F238E27FC236}">
-                    <a16:creationId xmlns:a16="http://schemas.microsoft.com/office/drawing/2014/main" id="{545C009A-DDEF-483B-B935-6B15197BABA8}"/>
-                  </a:ext>
-                </a:extLst>
-              </p:cNvPr>
-              <p:cNvCxnSpPr>
-                <a:cxnSpLocks/>
-                <a:stCxn id="6" idx="3"/>
-              </p:cNvCxnSpPr>
-              <p:nvPr/>
-            </p:nvCxnSpPr>
-            <p:spPr>
-              <a:xfrm>
-                <a:off x="5258698" y="3336668"/>
-                <a:ext cx="1265028" cy="0"/>
-              </a:xfrm>
-              <a:prstGeom prst="line">
-                <a:avLst/>
-              </a:prstGeom>
-              <a:ln w="25400">
-                <a:solidFill>
-                  <a:schemeClr val="tx1"/>
-                </a:solidFill>
-              </a:ln>
-            </p:spPr>
-            <p:style>
-              <a:lnRef idx="1">
-                <a:schemeClr val="accent1"/>
-              </a:lnRef>
-              <a:fillRef idx="0">
-                <a:schemeClr val="accent1"/>
-              </a:fillRef>
-              <a:effectRef idx="0">
-                <a:schemeClr val="accent1"/>
-              </a:effectRef>
-              <a:fontRef idx="minor">
+            <a:prstGeom prst="rect">
+              <a:avLst/>
+            </a:prstGeom>
+            <a:noFill/>
+          </p:spPr>
+          <p:txBody>
+            <a:bodyPr wrap="square" rtlCol="0">
+              <a:spAutoFit/>
+            </a:bodyPr>
+            <a:lstStyle/>
+            <a:p>
+              <a:pPr algn="ctr"/>
+              <a:r>
+                <a:rPr lang="en-US" sz="4800" dirty="0">
+                  <a:latin typeface="Bebas" pitchFamily="2" charset="0"/>
+                </a:rPr>
+                <a:t>Card   Co</a:t>
+              </a:r>
+            </a:p>
+          </p:txBody>
+        </p:sp>
+        <p:cxnSp>
+          <p:nvCxnSpPr>
+            <p:cNvPr id="8" name="Straight Connector 7">
+              <a:extLst>
+                <a:ext uri="{FF2B5EF4-FFF2-40B4-BE49-F238E27FC236}">
+                  <a16:creationId xmlns:a16="http://schemas.microsoft.com/office/drawing/2014/main" id="{545C009A-DDEF-483B-B935-6B15197BABA8}"/>
+                </a:ext>
+              </a:extLst>
+            </p:cNvPr>
+            <p:cNvCxnSpPr>
+              <a:cxnSpLocks/>
+              <a:stCxn id="6" idx="3"/>
+            </p:cNvCxnSpPr>
+            <p:nvPr/>
+          </p:nvCxnSpPr>
+          <p:spPr>
+            <a:xfrm>
+              <a:off x="7769023" y="3684911"/>
+              <a:ext cx="3373516" cy="0"/>
+            </a:xfrm>
+            <a:prstGeom prst="line">
+              <a:avLst/>
+            </a:prstGeom>
+            <a:ln w="63500">
+              <a:solidFill>
                 <a:schemeClr val="tx1"/>
-              </a:fontRef>
-            </p:style>
-          </p:cxnSp>
-          <p:cxnSp>
-            <p:nvCxnSpPr>
-              <p:cNvPr id="24" name="Straight Connector 23">
-                <a:extLst>
-                  <a:ext uri="{FF2B5EF4-FFF2-40B4-BE49-F238E27FC236}">
-                    <a16:creationId xmlns:a16="http://schemas.microsoft.com/office/drawing/2014/main" id="{46695AEA-7F4A-4C4E-AE67-F7ADCE7F3661}"/>
-                  </a:ext>
-                </a:extLst>
-              </p:cNvPr>
-              <p:cNvCxnSpPr>
-                <a:cxnSpLocks/>
-                <a:endCxn id="6" idx="1"/>
-              </p:cNvCxnSpPr>
-              <p:nvPr/>
-            </p:nvCxnSpPr>
-            <p:spPr>
-              <a:xfrm>
-                <a:off x="3001274" y="3336668"/>
-                <a:ext cx="1265028" cy="0"/>
-              </a:xfrm>
-              <a:prstGeom prst="line">
-                <a:avLst/>
-              </a:prstGeom>
-              <a:ln w="25400">
-                <a:solidFill>
-                  <a:schemeClr val="tx1"/>
-                </a:solidFill>
-              </a:ln>
-            </p:spPr>
-            <p:style>
-              <a:lnRef idx="1">
-                <a:schemeClr val="accent1"/>
-              </a:lnRef>
-              <a:fillRef idx="0">
-                <a:schemeClr val="accent1"/>
-              </a:fillRef>
-              <a:effectRef idx="0">
-                <a:schemeClr val="accent1"/>
-              </a:effectRef>
-              <a:fontRef idx="minor">
+              </a:solidFill>
+            </a:ln>
+          </p:spPr>
+          <p:style>
+            <a:lnRef idx="1">
+              <a:schemeClr val="accent1"/>
+            </a:lnRef>
+            <a:fillRef idx="0">
+              <a:schemeClr val="accent1"/>
+            </a:fillRef>
+            <a:effectRef idx="0">
+              <a:schemeClr val="accent1"/>
+            </a:effectRef>
+            <a:fontRef idx="minor">
+              <a:schemeClr val="tx1"/>
+            </a:fontRef>
+          </p:style>
+        </p:cxnSp>
+        <p:cxnSp>
+          <p:nvCxnSpPr>
+            <p:cNvPr id="12" name="Straight Connector 11">
+              <a:extLst>
+                <a:ext uri="{FF2B5EF4-FFF2-40B4-BE49-F238E27FC236}">
+                  <a16:creationId xmlns:a16="http://schemas.microsoft.com/office/drawing/2014/main" id="{69421926-4D6C-4CF1-BD38-D4D98BECA72D}"/>
+                </a:ext>
+              </a:extLst>
+            </p:cNvPr>
+            <p:cNvCxnSpPr>
+              <a:cxnSpLocks/>
+              <a:endCxn id="6" idx="1"/>
+            </p:cNvCxnSpPr>
+            <p:nvPr/>
+          </p:nvCxnSpPr>
+          <p:spPr>
+            <a:xfrm>
+              <a:off x="2061949" y="3684910"/>
+              <a:ext cx="3373515" cy="1"/>
+            </a:xfrm>
+            <a:prstGeom prst="line">
+              <a:avLst/>
+            </a:prstGeom>
+            <a:ln w="63500">
+              <a:solidFill>
                 <a:schemeClr val="tx1"/>
-              </a:fontRef>
-            </p:style>
-          </p:cxnSp>
-        </p:grpSp>
+              </a:solidFill>
+            </a:ln>
+          </p:spPr>
+          <p:style>
+            <a:lnRef idx="1">
+              <a:schemeClr val="accent1"/>
+            </a:lnRef>
+            <a:fillRef idx="0">
+              <a:schemeClr val="accent1"/>
+            </a:fillRef>
+            <a:effectRef idx="0">
+              <a:schemeClr val="accent1"/>
+            </a:effectRef>
+            <a:fontRef idx="minor">
+              <a:schemeClr val="tx1"/>
+            </a:fontRef>
+          </p:style>
+        </p:cxnSp>
       </p:grpSp>
     </p:spTree>
     <p:extLst>

</xml_diff>

<commit_message>
Started use of bootstrap. Added button press. Styled background and colors.
</commit_message>
<xml_diff>
--- a/dev/graphics.pptx
+++ b/dev/graphics.pptx
@@ -259,7 +259,7 @@
           <a:p>
             <a:fld id="{D66C5226-EF00-42D6-B14B-CC50C5A09372}" type="datetimeFigureOut">
               <a:rPr lang="en-US" smtClean="0"/>
-              <a:t>7/11/2018</a:t>
+              <a:t>7/13/2018</a:t>
             </a:fld>
             <a:endParaRPr lang="en-US"/>
           </a:p>
@@ -457,7 +457,7 @@
           <a:p>
             <a:fld id="{D66C5226-EF00-42D6-B14B-CC50C5A09372}" type="datetimeFigureOut">
               <a:rPr lang="en-US" smtClean="0"/>
-              <a:t>7/11/2018</a:t>
+              <a:t>7/13/2018</a:t>
             </a:fld>
             <a:endParaRPr lang="en-US"/>
           </a:p>
@@ -665,7 +665,7 @@
           <a:p>
             <a:fld id="{D66C5226-EF00-42D6-B14B-CC50C5A09372}" type="datetimeFigureOut">
               <a:rPr lang="en-US" smtClean="0"/>
-              <a:t>7/11/2018</a:t>
+              <a:t>7/13/2018</a:t>
             </a:fld>
             <a:endParaRPr lang="en-US"/>
           </a:p>
@@ -863,7 +863,7 @@
           <a:p>
             <a:fld id="{D66C5226-EF00-42D6-B14B-CC50C5A09372}" type="datetimeFigureOut">
               <a:rPr lang="en-US" smtClean="0"/>
-              <a:t>7/11/2018</a:t>
+              <a:t>7/13/2018</a:t>
             </a:fld>
             <a:endParaRPr lang="en-US"/>
           </a:p>
@@ -1138,7 +1138,7 @@
           <a:p>
             <a:fld id="{D66C5226-EF00-42D6-B14B-CC50C5A09372}" type="datetimeFigureOut">
               <a:rPr lang="en-US" smtClean="0"/>
-              <a:t>7/11/2018</a:t>
+              <a:t>7/13/2018</a:t>
             </a:fld>
             <a:endParaRPr lang="en-US"/>
           </a:p>
@@ -1403,7 +1403,7 @@
           <a:p>
             <a:fld id="{D66C5226-EF00-42D6-B14B-CC50C5A09372}" type="datetimeFigureOut">
               <a:rPr lang="en-US" smtClean="0"/>
-              <a:t>7/11/2018</a:t>
+              <a:t>7/13/2018</a:t>
             </a:fld>
             <a:endParaRPr lang="en-US"/>
           </a:p>
@@ -1815,7 +1815,7 @@
           <a:p>
             <a:fld id="{D66C5226-EF00-42D6-B14B-CC50C5A09372}" type="datetimeFigureOut">
               <a:rPr lang="en-US" smtClean="0"/>
-              <a:t>7/11/2018</a:t>
+              <a:t>7/13/2018</a:t>
             </a:fld>
             <a:endParaRPr lang="en-US"/>
           </a:p>
@@ -1956,7 +1956,7 @@
           <a:p>
             <a:fld id="{D66C5226-EF00-42D6-B14B-CC50C5A09372}" type="datetimeFigureOut">
               <a:rPr lang="en-US" smtClean="0"/>
-              <a:t>7/11/2018</a:t>
+              <a:t>7/13/2018</a:t>
             </a:fld>
             <a:endParaRPr lang="en-US"/>
           </a:p>
@@ -2069,7 +2069,7 @@
           <a:p>
             <a:fld id="{D66C5226-EF00-42D6-B14B-CC50C5A09372}" type="datetimeFigureOut">
               <a:rPr lang="en-US" smtClean="0"/>
-              <a:t>7/11/2018</a:t>
+              <a:t>7/13/2018</a:t>
             </a:fld>
             <a:endParaRPr lang="en-US"/>
           </a:p>
@@ -2380,7 +2380,7 @@
           <a:p>
             <a:fld id="{D66C5226-EF00-42D6-B14B-CC50C5A09372}" type="datetimeFigureOut">
               <a:rPr lang="en-US" smtClean="0"/>
-              <a:t>7/11/2018</a:t>
+              <a:t>7/13/2018</a:t>
             </a:fld>
             <a:endParaRPr lang="en-US"/>
           </a:p>
@@ -2668,7 +2668,7 @@
           <a:p>
             <a:fld id="{D66C5226-EF00-42D6-B14B-CC50C5A09372}" type="datetimeFigureOut">
               <a:rPr lang="en-US" smtClean="0"/>
-              <a:t>7/11/2018</a:t>
+              <a:t>7/13/2018</a:t>
             </a:fld>
             <a:endParaRPr lang="en-US"/>
           </a:p>
@@ -2909,7 +2909,7 @@
           <a:p>
             <a:fld id="{D66C5226-EF00-42D6-B14B-CC50C5A09372}" type="datetimeFigureOut">
               <a:rPr lang="en-US" smtClean="0"/>
-              <a:t>7/11/2018</a:t>
+              <a:t>7/13/2018</a:t>
             </a:fld>
             <a:endParaRPr lang="en-US"/>
           </a:p>
@@ -3312,6 +3312,14 @@
 <file path=ppt/slides/slide1.xml><?xml version="1.0" encoding="utf-8"?>
 <p:sld xmlns:a="http://schemas.openxmlformats.org/drawingml/2006/main" xmlns:r="http://schemas.openxmlformats.org/officeDocument/2006/relationships" xmlns:p="http://schemas.openxmlformats.org/presentationml/2006/main">
   <p:cSld>
+    <p:bg>
+      <p:bgPr>
+        <a:solidFill>
+          <a:srgbClr val="FFFF00"/>
+        </a:solidFill>
+        <a:effectLst/>
+      </p:bgPr>
+    </p:bg>
     <p:spTree>
       <p:nvGrpSpPr>
         <p:cNvPr id="1" name=""/>

</xml_diff>